<commit_message>
Update to Generalized Order Validation
</commit_message>
<xml_diff>
--- a/docs/dev/ideas.pptx
+++ b/docs/dev/ideas.pptx
@@ -3883,8 +3883,9 @@
           <a:p>
             <a:r>
               <a:rPr lang="en-US" dirty="0" smtClean="0"/>
-              <a:t>Possible Solutions</a:t>
-            </a:r>
+              <a:t>Alternative Solution</a:t>
+            </a:r>
+            <a:endParaRPr lang="en-US" dirty="0" smtClean="0"/>
           </a:p>
           <a:p>
             <a:pPr lvl="1"/>
@@ -3897,8 +3898,38 @@
             <a:pPr lvl="2"/>
             <a:r>
               <a:rPr lang="en-US" dirty="0" smtClean="0"/>
-              <a:t>Such inputs should never be used for modifying the scenario, since these orders would not go in the CIF or hence in scenario export scripts.</a:t>
-            </a:r>
+              <a:t>Such inputs should never be used for modifying the scenario, since these orders would not go in the CIF or hence in scenario export scripts</a:t>
+            </a:r>
+            <a:r>
+              <a:rPr lang="en-US" dirty="0" smtClean="0"/>
+              <a:t>.</a:t>
+            </a:r>
+          </a:p>
+          <a:p>
+            <a:pPr lvl="2"/>
+            <a:r>
+              <a:rPr lang="en-US" dirty="0" smtClean="0"/>
+              <a:t>E.g., define GUI:* orders, and make Athena’s CIF mechanism ignore them.</a:t>
+            </a:r>
+          </a:p>
+          <a:p>
+            <a:pPr lvl="3"/>
+            <a:r>
+              <a:rPr lang="en-US" dirty="0" smtClean="0"/>
+              <a:t>REPORT:* orders were handled in this way.</a:t>
+            </a:r>
+          </a:p>
+          <a:p>
+            <a:pPr lvl="2"/>
+            <a:r>
+              <a:rPr lang="en-US" dirty="0" smtClean="0"/>
+              <a:t>The GUI:* handlers only validate; they do nothing else.  Thus, [order check] can be used to validate the input, which is then used as </a:t>
+            </a:r>
+            <a:r>
+              <a:rPr lang="en-US" smtClean="0"/>
+              <a:t>the application desires.</a:t>
+            </a:r>
+            <a:endParaRPr lang="en-US" dirty="0" smtClean="0"/>
           </a:p>
         </p:txBody>
       </p:sp>

</xml_diff>